<commit_message>
Start of compilation process
</commit_message>
<xml_diff>
--- a/images/images.pptx
+++ b/images/images.pptx
@@ -7,6 +7,7 @@
   <p:sldIdLst>
     <p:sldId id="256" r:id="rId2"/>
     <p:sldId id="257" r:id="rId3"/>
+    <p:sldId id="258" r:id="rId4"/>
   </p:sldIdLst>
   <p:sldSz cx="12192000" cy="6858000"/>
   <p:notesSz cx="6858000" cy="9144000"/>
@@ -105,6 +106,11 @@
       </a:defRPr>
     </a:lvl9pPr>
   </p:defaultTextStyle>
+  <p:extLst>
+    <p:ext uri="{EFAFB233-063F-42B5-8137-9DF3F51BA10A}">
+      <p15:sldGuideLst xmlns:p15="http://schemas.microsoft.com/office/powerpoint/2012/main"/>
+    </p:ext>
+  </p:extLst>
 </p:presentation>
 </file>
 
@@ -153,7 +159,6 @@
               <a:rPr lang="en-US"/>
               <a:t>Click to edit Master title style</a:t>
             </a:r>
-            <a:endParaRPr lang="en-US"/>
           </a:p>
         </p:txBody>
       </p:sp>
@@ -218,7 +223,6 @@
               <a:rPr lang="en-US"/>
               <a:t>Click to edit Master subtitle style</a:t>
             </a:r>
-            <a:endParaRPr lang="en-US"/>
           </a:p>
         </p:txBody>
       </p:sp>
@@ -239,7 +243,7 @@
           <a:p>
             <a:fld id="{37667E32-F2C9-4456-84AC-4BF1D49035BA}" type="datetimeFigureOut">
               <a:rPr lang="en-US" smtClean="0"/>
-              <a:t>8/30/2016</a:t>
+              <a:t>8/31/2016</a:t>
             </a:fld>
             <a:endParaRPr lang="en-US"/>
           </a:p>
@@ -336,7 +340,6 @@
               <a:rPr lang="en-US"/>
               <a:t>Click to edit Master title style</a:t>
             </a:r>
-            <a:endParaRPr lang="en-US"/>
           </a:p>
         </p:txBody>
       </p:sp>
@@ -388,7 +391,6 @@
               <a:rPr lang="en-US"/>
               <a:t>Fifth level</a:t>
             </a:r>
-            <a:endParaRPr lang="en-US"/>
           </a:p>
         </p:txBody>
       </p:sp>
@@ -409,7 +411,7 @@
           <a:p>
             <a:fld id="{37667E32-F2C9-4456-84AC-4BF1D49035BA}" type="datetimeFigureOut">
               <a:rPr lang="en-US" smtClean="0"/>
-              <a:t>8/30/2016</a:t>
+              <a:t>8/31/2016</a:t>
             </a:fld>
             <a:endParaRPr lang="en-US"/>
           </a:p>
@@ -511,7 +513,6 @@
               <a:rPr lang="en-US"/>
               <a:t>Click to edit Master title style</a:t>
             </a:r>
-            <a:endParaRPr lang="en-US"/>
           </a:p>
         </p:txBody>
       </p:sp>
@@ -568,7 +569,6 @@
               <a:rPr lang="en-US"/>
               <a:t>Fifth level</a:t>
             </a:r>
-            <a:endParaRPr lang="en-US"/>
           </a:p>
         </p:txBody>
       </p:sp>
@@ -589,7 +589,7 @@
           <a:p>
             <a:fld id="{37667E32-F2C9-4456-84AC-4BF1D49035BA}" type="datetimeFigureOut">
               <a:rPr lang="en-US" smtClean="0"/>
-              <a:t>8/30/2016</a:t>
+              <a:t>8/31/2016</a:t>
             </a:fld>
             <a:endParaRPr lang="en-US"/>
           </a:p>
@@ -686,7 +686,6 @@
               <a:rPr lang="en-US"/>
               <a:t>Click to edit Master title style</a:t>
             </a:r>
-            <a:endParaRPr lang="en-US"/>
           </a:p>
         </p:txBody>
       </p:sp>
@@ -738,7 +737,6 @@
               <a:rPr lang="en-US"/>
               <a:t>Fifth level</a:t>
             </a:r>
-            <a:endParaRPr lang="en-US"/>
           </a:p>
         </p:txBody>
       </p:sp>
@@ -759,7 +757,7 @@
           <a:p>
             <a:fld id="{37667E32-F2C9-4456-84AC-4BF1D49035BA}" type="datetimeFigureOut">
               <a:rPr lang="en-US" smtClean="0"/>
-              <a:t>8/30/2016</a:t>
+              <a:t>8/31/2016</a:t>
             </a:fld>
             <a:endParaRPr lang="en-US"/>
           </a:p>
@@ -865,7 +863,6 @@
               <a:rPr lang="en-US"/>
               <a:t>Click to edit Master title style</a:t>
             </a:r>
-            <a:endParaRPr lang="en-US"/>
           </a:p>
         </p:txBody>
       </p:sp>
@@ -1005,7 +1002,7 @@
           <a:p>
             <a:fld id="{37667E32-F2C9-4456-84AC-4BF1D49035BA}" type="datetimeFigureOut">
               <a:rPr lang="en-US" smtClean="0"/>
-              <a:t>8/30/2016</a:t>
+              <a:t>8/31/2016</a:t>
             </a:fld>
             <a:endParaRPr lang="en-US"/>
           </a:p>
@@ -1102,7 +1099,6 @@
               <a:rPr lang="en-US"/>
               <a:t>Click to edit Master title style</a:t>
             </a:r>
-            <a:endParaRPr lang="en-US"/>
           </a:p>
         </p:txBody>
       </p:sp>
@@ -1159,7 +1155,6 @@
               <a:rPr lang="en-US"/>
               <a:t>Fifth level</a:t>
             </a:r>
-            <a:endParaRPr lang="en-US"/>
           </a:p>
         </p:txBody>
       </p:sp>
@@ -1216,7 +1211,6 @@
               <a:rPr lang="en-US"/>
               <a:t>Fifth level</a:t>
             </a:r>
-            <a:endParaRPr lang="en-US"/>
           </a:p>
         </p:txBody>
       </p:sp>
@@ -1237,7 +1231,7 @@
           <a:p>
             <a:fld id="{37667E32-F2C9-4456-84AC-4BF1D49035BA}" type="datetimeFigureOut">
               <a:rPr lang="en-US" smtClean="0"/>
-              <a:t>8/30/2016</a:t>
+              <a:t>8/31/2016</a:t>
             </a:fld>
             <a:endParaRPr lang="en-US"/>
           </a:p>
@@ -1339,7 +1333,6 @@
               <a:rPr lang="en-US"/>
               <a:t>Click to edit Master title style</a:t>
             </a:r>
-            <a:endParaRPr lang="en-US"/>
           </a:p>
         </p:txBody>
       </p:sp>
@@ -1461,7 +1454,6 @@
               <a:rPr lang="en-US"/>
               <a:t>Fifth level</a:t>
             </a:r>
-            <a:endParaRPr lang="en-US"/>
           </a:p>
         </p:txBody>
       </p:sp>
@@ -1583,7 +1575,6 @@
               <a:rPr lang="en-US"/>
               <a:t>Fifth level</a:t>
             </a:r>
-            <a:endParaRPr lang="en-US"/>
           </a:p>
         </p:txBody>
       </p:sp>
@@ -1604,7 +1595,7 @@
           <a:p>
             <a:fld id="{37667E32-F2C9-4456-84AC-4BF1D49035BA}" type="datetimeFigureOut">
               <a:rPr lang="en-US" smtClean="0"/>
-              <a:t>8/30/2016</a:t>
+              <a:t>8/31/2016</a:t>
             </a:fld>
             <a:endParaRPr lang="en-US"/>
           </a:p>
@@ -1701,7 +1692,6 @@
               <a:rPr lang="en-US"/>
               <a:t>Click to edit Master title style</a:t>
             </a:r>
-            <a:endParaRPr lang="en-US"/>
           </a:p>
         </p:txBody>
       </p:sp>
@@ -1722,7 +1712,7 @@
           <a:p>
             <a:fld id="{37667E32-F2C9-4456-84AC-4BF1D49035BA}" type="datetimeFigureOut">
               <a:rPr lang="en-US" smtClean="0"/>
-              <a:t>8/30/2016</a:t>
+              <a:t>8/31/2016</a:t>
             </a:fld>
             <a:endParaRPr lang="en-US"/>
           </a:p>
@@ -1817,7 +1807,7 @@
           <a:p>
             <a:fld id="{37667E32-F2C9-4456-84AC-4BF1D49035BA}" type="datetimeFigureOut">
               <a:rPr lang="en-US" smtClean="0"/>
-              <a:t>8/30/2016</a:t>
+              <a:t>8/31/2016</a:t>
             </a:fld>
             <a:endParaRPr lang="en-US"/>
           </a:p>
@@ -1923,7 +1913,6 @@
               <a:rPr lang="en-US"/>
               <a:t>Click to edit Master title style</a:t>
             </a:r>
-            <a:endParaRPr lang="en-US"/>
           </a:p>
         </p:txBody>
       </p:sp>
@@ -2008,7 +1997,6 @@
               <a:rPr lang="en-US"/>
               <a:t>Fifth level</a:t>
             </a:r>
-            <a:endParaRPr lang="en-US"/>
           </a:p>
         </p:txBody>
       </p:sp>
@@ -2094,7 +2082,7 @@
           <a:p>
             <a:fld id="{37667E32-F2C9-4456-84AC-4BF1D49035BA}" type="datetimeFigureOut">
               <a:rPr lang="en-US" smtClean="0"/>
-              <a:t>8/30/2016</a:t>
+              <a:t>8/31/2016</a:t>
             </a:fld>
             <a:endParaRPr lang="en-US"/>
           </a:p>
@@ -2200,7 +2188,6 @@
               <a:rPr lang="en-US"/>
               <a:t>Click to edit Master title style</a:t>
             </a:r>
-            <a:endParaRPr lang="en-US"/>
           </a:p>
         </p:txBody>
       </p:sp>
@@ -2347,7 +2334,7 @@
           <a:p>
             <a:fld id="{37667E32-F2C9-4456-84AC-4BF1D49035BA}" type="datetimeFigureOut">
               <a:rPr lang="en-US" smtClean="0"/>
-              <a:t>8/30/2016</a:t>
+              <a:t>8/31/2016</a:t>
             </a:fld>
             <a:endParaRPr lang="en-US"/>
           </a:p>
@@ -2459,7 +2446,6 @@
               <a:rPr lang="en-US"/>
               <a:t>Click to edit Master title style</a:t>
             </a:r>
-            <a:endParaRPr lang="en-US"/>
           </a:p>
         </p:txBody>
       </p:sp>
@@ -2521,7 +2507,6 @@
               <a:rPr lang="en-US"/>
               <a:t>Fifth level</a:t>
             </a:r>
-            <a:endParaRPr lang="en-US"/>
           </a:p>
         </p:txBody>
       </p:sp>
@@ -2560,7 +2545,7 @@
           <a:p>
             <a:fld id="{37667E32-F2C9-4456-84AC-4BF1D49035BA}" type="datetimeFigureOut">
               <a:rPr lang="en-US" smtClean="0"/>
-              <a:t>8/30/2016</a:t>
+              <a:t>8/31/2016</a:t>
             </a:fld>
             <a:endParaRPr lang="en-US"/>
           </a:p>
@@ -3234,6 +3219,1191 @@
 </p:sld>
 </file>
 
+<file path=ppt/slides/slide3.xml><?xml version="1.0" encoding="utf-8"?>
+<p:sld xmlns:a="http://schemas.openxmlformats.org/drawingml/2006/main" xmlns:r="http://schemas.openxmlformats.org/officeDocument/2006/relationships" xmlns:p="http://schemas.openxmlformats.org/presentationml/2006/main">
+  <p:cSld>
+    <p:spTree>
+      <p:nvGrpSpPr>
+        <p:cNvPr id="1" name=""/>
+        <p:cNvGrpSpPr/>
+        <p:nvPr/>
+      </p:nvGrpSpPr>
+      <p:grpSpPr>
+        <a:xfrm>
+          <a:off x="0" y="0"/>
+          <a:ext cx="0" cy="0"/>
+          <a:chOff x="0" y="0"/>
+          <a:chExt cx="0" cy="0"/>
+        </a:xfrm>
+      </p:grpSpPr>
+      <p:grpSp>
+        <p:nvGrpSpPr>
+          <p:cNvPr id="70" name="Group 69"/>
+          <p:cNvGrpSpPr/>
+          <p:nvPr/>
+        </p:nvGrpSpPr>
+        <p:grpSpPr>
+          <a:xfrm>
+            <a:off x="2921243" y="159804"/>
+            <a:ext cx="6020534" cy="6311334"/>
+            <a:chOff x="2921243" y="159804"/>
+            <a:chExt cx="6020534" cy="6311334"/>
+          </a:xfrm>
+        </p:grpSpPr>
+        <p:sp>
+          <p:nvSpPr>
+            <p:cNvPr id="2" name="Rounded Rectangle 1"/>
+            <p:cNvSpPr/>
+            <p:nvPr/>
+          </p:nvSpPr>
+          <p:spPr>
+            <a:xfrm>
+              <a:off x="4044462" y="931561"/>
+              <a:ext cx="1749668" cy="413238"/>
+            </a:xfrm>
+            <a:prstGeom prst="roundRect">
+              <a:avLst/>
+            </a:prstGeom>
+          </p:spPr>
+          <p:style>
+            <a:lnRef idx="0">
+              <a:schemeClr val="accent6"/>
+            </a:lnRef>
+            <a:fillRef idx="3">
+              <a:schemeClr val="accent6"/>
+            </a:fillRef>
+            <a:effectRef idx="3">
+              <a:schemeClr val="accent6"/>
+            </a:effectRef>
+            <a:fontRef idx="minor">
+              <a:schemeClr val="lt1"/>
+            </a:fontRef>
+          </p:style>
+          <p:txBody>
+            <a:bodyPr rtlCol="0" anchor="ctr"/>
+            <a:lstStyle/>
+            <a:p>
+              <a:pPr algn="ctr"/>
+              <a:r>
+                <a:rPr lang="en-US" dirty="0"/>
+                <a:t>Pre-processor</a:t>
+              </a:r>
+            </a:p>
+          </p:txBody>
+        </p:sp>
+        <p:sp>
+          <p:nvSpPr>
+            <p:cNvPr id="3" name="Rectangle 2"/>
+            <p:cNvSpPr/>
+            <p:nvPr/>
+          </p:nvSpPr>
+          <p:spPr>
+            <a:xfrm>
+              <a:off x="4343400" y="176618"/>
+              <a:ext cx="1151792" cy="465993"/>
+            </a:xfrm>
+            <a:prstGeom prst="rect">
+              <a:avLst/>
+            </a:prstGeom>
+          </p:spPr>
+          <p:style>
+            <a:lnRef idx="0">
+              <a:schemeClr val="dk1"/>
+            </a:lnRef>
+            <a:fillRef idx="3">
+              <a:schemeClr val="dk1"/>
+            </a:fillRef>
+            <a:effectRef idx="3">
+              <a:schemeClr val="dk1"/>
+            </a:effectRef>
+            <a:fontRef idx="minor">
+              <a:schemeClr val="lt1"/>
+            </a:fontRef>
+          </p:style>
+          <p:txBody>
+            <a:bodyPr rtlCol="0" anchor="ctr"/>
+            <a:lstStyle/>
+            <a:p>
+              <a:pPr algn="ctr"/>
+              <a:r>
+                <a:rPr lang="en-US" dirty="0"/>
+                <a:t>main.cpp</a:t>
+              </a:r>
+            </a:p>
+          </p:txBody>
+        </p:sp>
+        <p:sp>
+          <p:nvSpPr>
+            <p:cNvPr id="4" name="Rectangle 3"/>
+            <p:cNvSpPr/>
+            <p:nvPr/>
+          </p:nvSpPr>
+          <p:spPr>
+            <a:xfrm>
+              <a:off x="6370026" y="905008"/>
+              <a:ext cx="2246435" cy="466344"/>
+            </a:xfrm>
+            <a:prstGeom prst="rect">
+              <a:avLst/>
+            </a:prstGeom>
+          </p:spPr>
+          <p:style>
+            <a:lnRef idx="0">
+              <a:schemeClr val="dk1"/>
+            </a:lnRef>
+            <a:fillRef idx="3">
+              <a:schemeClr val="dk1"/>
+            </a:fillRef>
+            <a:effectRef idx="3">
+              <a:schemeClr val="dk1"/>
+            </a:effectRef>
+            <a:fontRef idx="minor">
+              <a:schemeClr val="lt1"/>
+            </a:fontRef>
+          </p:style>
+          <p:txBody>
+            <a:bodyPr rtlCol="0" anchor="ctr"/>
+            <a:lstStyle/>
+            <a:p>
+              <a:pPr algn="ctr"/>
+              <a:r>
+                <a:rPr lang="en-US" dirty="0"/>
+                <a:t>#include header files</a:t>
+              </a:r>
+            </a:p>
+          </p:txBody>
+        </p:sp>
+        <p:cxnSp>
+          <p:nvCxnSpPr>
+            <p:cNvPr id="6" name="Straight Arrow Connector 5"/>
+            <p:cNvCxnSpPr>
+              <a:stCxn id="4" idx="1"/>
+              <a:endCxn id="2" idx="3"/>
+            </p:cNvCxnSpPr>
+            <p:nvPr/>
+          </p:nvCxnSpPr>
+          <p:spPr>
+            <a:xfrm flipH="1">
+              <a:off x="5794130" y="1138180"/>
+              <a:ext cx="575896" cy="0"/>
+            </a:xfrm>
+            <a:prstGeom prst="straightConnector1">
+              <a:avLst/>
+            </a:prstGeom>
+            <a:ln w="38100">
+              <a:tailEnd type="triangle"/>
+            </a:ln>
+          </p:spPr>
+          <p:style>
+            <a:lnRef idx="3">
+              <a:schemeClr val="dk1"/>
+            </a:lnRef>
+            <a:fillRef idx="0">
+              <a:schemeClr val="dk1"/>
+            </a:fillRef>
+            <a:effectRef idx="2">
+              <a:schemeClr val="dk1"/>
+            </a:effectRef>
+            <a:fontRef idx="minor">
+              <a:schemeClr val="tx1"/>
+            </a:fontRef>
+          </p:style>
+        </p:cxnSp>
+        <p:cxnSp>
+          <p:nvCxnSpPr>
+            <p:cNvPr id="7" name="Straight Arrow Connector 6"/>
+            <p:cNvCxnSpPr>
+              <a:stCxn id="3" idx="2"/>
+              <a:endCxn id="2" idx="0"/>
+            </p:cNvCxnSpPr>
+            <p:nvPr/>
+          </p:nvCxnSpPr>
+          <p:spPr>
+            <a:xfrm>
+              <a:off x="4919296" y="642611"/>
+              <a:ext cx="0" cy="288950"/>
+            </a:xfrm>
+            <a:prstGeom prst="straightConnector1">
+              <a:avLst/>
+            </a:prstGeom>
+            <a:ln w="38100">
+              <a:tailEnd type="triangle"/>
+            </a:ln>
+          </p:spPr>
+          <p:style>
+            <a:lnRef idx="3">
+              <a:schemeClr val="dk1"/>
+            </a:lnRef>
+            <a:fillRef idx="0">
+              <a:schemeClr val="dk1"/>
+            </a:fillRef>
+            <a:effectRef idx="2">
+              <a:schemeClr val="dk1"/>
+            </a:effectRef>
+            <a:fontRef idx="minor">
+              <a:schemeClr val="tx1"/>
+            </a:fontRef>
+          </p:style>
+        </p:cxnSp>
+        <p:cxnSp>
+          <p:nvCxnSpPr>
+            <p:cNvPr id="10" name="Straight Arrow Connector 9"/>
+            <p:cNvCxnSpPr>
+              <a:stCxn id="2" idx="2"/>
+              <a:endCxn id="16" idx="0"/>
+            </p:cNvCxnSpPr>
+            <p:nvPr/>
+          </p:nvCxnSpPr>
+          <p:spPr>
+            <a:xfrm>
+              <a:off x="4919296" y="1344799"/>
+              <a:ext cx="0" cy="288950"/>
+            </a:xfrm>
+            <a:prstGeom prst="straightConnector1">
+              <a:avLst/>
+            </a:prstGeom>
+            <a:ln w="38100">
+              <a:tailEnd type="triangle"/>
+            </a:ln>
+          </p:spPr>
+          <p:style>
+            <a:lnRef idx="3">
+              <a:schemeClr val="dk1"/>
+            </a:lnRef>
+            <a:fillRef idx="0">
+              <a:schemeClr val="dk1"/>
+            </a:fillRef>
+            <a:effectRef idx="2">
+              <a:schemeClr val="dk1"/>
+            </a:effectRef>
+            <a:fontRef idx="minor">
+              <a:schemeClr val="tx1"/>
+            </a:fontRef>
+          </p:style>
+        </p:cxnSp>
+        <p:sp>
+          <p:nvSpPr>
+            <p:cNvPr id="13" name="TextBox 12"/>
+            <p:cNvSpPr txBox="1"/>
+            <p:nvPr/>
+          </p:nvSpPr>
+          <p:spPr>
+            <a:xfrm>
+              <a:off x="2921243" y="159804"/>
+              <a:ext cx="1239716" cy="461665"/>
+            </a:xfrm>
+            <a:prstGeom prst="rect">
+              <a:avLst/>
+            </a:prstGeom>
+            <a:noFill/>
+          </p:spPr>
+          <p:txBody>
+            <a:bodyPr wrap="square" rtlCol="0">
+              <a:spAutoFit/>
+            </a:bodyPr>
+            <a:lstStyle/>
+            <a:p>
+              <a:pPr algn="ctr"/>
+              <a:r>
+                <a:rPr lang="en-US" sz="1200" i="1" dirty="0">
+                  <a:solidFill>
+                    <a:srgbClr val="0070C0"/>
+                  </a:solidFill>
+                </a:rPr>
+                <a:t>Human readable source code</a:t>
+              </a:r>
+            </a:p>
+          </p:txBody>
+        </p:sp>
+        <p:sp>
+          <p:nvSpPr>
+            <p:cNvPr id="15" name="TextBox 14"/>
+            <p:cNvSpPr txBox="1"/>
+            <p:nvPr/>
+          </p:nvSpPr>
+          <p:spPr>
+            <a:xfrm>
+              <a:off x="2921243" y="1633749"/>
+              <a:ext cx="1239716" cy="461665"/>
+            </a:xfrm>
+            <a:prstGeom prst="rect">
+              <a:avLst/>
+            </a:prstGeom>
+            <a:noFill/>
+          </p:spPr>
+          <p:txBody>
+            <a:bodyPr wrap="square" rtlCol="0">
+              <a:spAutoFit/>
+            </a:bodyPr>
+            <a:lstStyle/>
+            <a:p>
+              <a:pPr algn="ctr"/>
+              <a:r>
+                <a:rPr lang="en-US" sz="1200" i="1" dirty="0">
+                  <a:solidFill>
+                    <a:srgbClr val="0070C0"/>
+                  </a:solidFill>
+                </a:rPr>
+                <a:t>Expanded source code</a:t>
+              </a:r>
+            </a:p>
+          </p:txBody>
+        </p:sp>
+        <p:sp>
+          <p:nvSpPr>
+            <p:cNvPr id="16" name="Rectangle 15"/>
+            <p:cNvSpPr/>
+            <p:nvPr/>
+          </p:nvSpPr>
+          <p:spPr>
+            <a:xfrm>
+              <a:off x="4343400" y="1633749"/>
+              <a:ext cx="1151792" cy="465993"/>
+            </a:xfrm>
+            <a:prstGeom prst="rect">
+              <a:avLst/>
+            </a:prstGeom>
+          </p:spPr>
+          <p:style>
+            <a:lnRef idx="0">
+              <a:schemeClr val="accent3"/>
+            </a:lnRef>
+            <a:fillRef idx="3">
+              <a:schemeClr val="accent3"/>
+            </a:fillRef>
+            <a:effectRef idx="3">
+              <a:schemeClr val="accent3"/>
+            </a:effectRef>
+            <a:fontRef idx="minor">
+              <a:schemeClr val="lt1"/>
+            </a:fontRef>
+          </p:style>
+          <p:txBody>
+            <a:bodyPr rtlCol="0" anchor="ctr"/>
+            <a:lstStyle/>
+            <a:p>
+              <a:pPr algn="ctr"/>
+              <a:r>
+                <a:rPr lang="en-US" dirty="0" err="1"/>
+                <a:t>main.ii</a:t>
+              </a:r>
+              <a:endParaRPr lang="en-US" dirty="0"/>
+            </a:p>
+          </p:txBody>
+        </p:sp>
+        <p:cxnSp>
+          <p:nvCxnSpPr>
+            <p:cNvPr id="18" name="Straight Arrow Connector 17"/>
+            <p:cNvCxnSpPr>
+              <a:stCxn id="16" idx="2"/>
+              <a:endCxn id="20" idx="0"/>
+            </p:cNvCxnSpPr>
+            <p:nvPr/>
+          </p:nvCxnSpPr>
+          <p:spPr>
+            <a:xfrm>
+              <a:off x="4919296" y="2099742"/>
+              <a:ext cx="0" cy="288950"/>
+            </a:xfrm>
+            <a:prstGeom prst="straightConnector1">
+              <a:avLst/>
+            </a:prstGeom>
+            <a:ln w="38100">
+              <a:tailEnd type="triangle"/>
+            </a:ln>
+          </p:spPr>
+          <p:style>
+            <a:lnRef idx="3">
+              <a:schemeClr val="dk1"/>
+            </a:lnRef>
+            <a:fillRef idx="0">
+              <a:schemeClr val="dk1"/>
+            </a:fillRef>
+            <a:effectRef idx="2">
+              <a:schemeClr val="dk1"/>
+            </a:effectRef>
+            <a:fontRef idx="minor">
+              <a:schemeClr val="tx1"/>
+            </a:fontRef>
+          </p:style>
+        </p:cxnSp>
+        <p:sp>
+          <p:nvSpPr>
+            <p:cNvPr id="20" name="Rounded Rectangle 19"/>
+            <p:cNvSpPr/>
+            <p:nvPr/>
+          </p:nvSpPr>
+          <p:spPr>
+            <a:xfrm>
+              <a:off x="4044462" y="2388692"/>
+              <a:ext cx="1749668" cy="413238"/>
+            </a:xfrm>
+            <a:prstGeom prst="roundRect">
+              <a:avLst/>
+            </a:prstGeom>
+          </p:spPr>
+          <p:style>
+            <a:lnRef idx="0">
+              <a:schemeClr val="accent6"/>
+            </a:lnRef>
+            <a:fillRef idx="3">
+              <a:schemeClr val="accent6"/>
+            </a:fillRef>
+            <a:effectRef idx="3">
+              <a:schemeClr val="accent6"/>
+            </a:effectRef>
+            <a:fontRef idx="minor">
+              <a:schemeClr val="lt1"/>
+            </a:fontRef>
+          </p:style>
+          <p:txBody>
+            <a:bodyPr rtlCol="0" anchor="ctr"/>
+            <a:lstStyle/>
+            <a:p>
+              <a:pPr algn="ctr"/>
+              <a:r>
+                <a:rPr lang="en-US" dirty="0"/>
+                <a:t>Compiler</a:t>
+              </a:r>
+            </a:p>
+          </p:txBody>
+        </p:sp>
+        <p:cxnSp>
+          <p:nvCxnSpPr>
+            <p:cNvPr id="26" name="Straight Arrow Connector 25"/>
+            <p:cNvCxnSpPr>
+              <a:stCxn id="20" idx="2"/>
+              <a:endCxn id="27" idx="0"/>
+            </p:cNvCxnSpPr>
+            <p:nvPr/>
+          </p:nvCxnSpPr>
+          <p:spPr>
+            <a:xfrm>
+              <a:off x="4919296" y="2801930"/>
+              <a:ext cx="0" cy="288950"/>
+            </a:xfrm>
+            <a:prstGeom prst="straightConnector1">
+              <a:avLst/>
+            </a:prstGeom>
+            <a:ln w="38100">
+              <a:tailEnd type="triangle"/>
+            </a:ln>
+          </p:spPr>
+          <p:style>
+            <a:lnRef idx="3">
+              <a:schemeClr val="dk1"/>
+            </a:lnRef>
+            <a:fillRef idx="0">
+              <a:schemeClr val="dk1"/>
+            </a:fillRef>
+            <a:effectRef idx="2">
+              <a:schemeClr val="dk1"/>
+            </a:effectRef>
+            <a:fontRef idx="minor">
+              <a:schemeClr val="tx1"/>
+            </a:fontRef>
+          </p:style>
+        </p:cxnSp>
+        <p:sp>
+          <p:nvSpPr>
+            <p:cNvPr id="27" name="Rectangle 26"/>
+            <p:cNvSpPr/>
+            <p:nvPr/>
+          </p:nvSpPr>
+          <p:spPr>
+            <a:xfrm>
+              <a:off x="4343400" y="3090880"/>
+              <a:ext cx="1151792" cy="465993"/>
+            </a:xfrm>
+            <a:prstGeom prst="rect">
+              <a:avLst/>
+            </a:prstGeom>
+          </p:spPr>
+          <p:style>
+            <a:lnRef idx="0">
+              <a:schemeClr val="accent3"/>
+            </a:lnRef>
+            <a:fillRef idx="3">
+              <a:schemeClr val="accent3"/>
+            </a:fillRef>
+            <a:effectRef idx="3">
+              <a:schemeClr val="accent3"/>
+            </a:effectRef>
+            <a:fontRef idx="minor">
+              <a:schemeClr val="lt1"/>
+            </a:fontRef>
+          </p:style>
+          <p:txBody>
+            <a:bodyPr rtlCol="0" anchor="ctr"/>
+            <a:lstStyle/>
+            <a:p>
+              <a:pPr algn="ctr"/>
+              <a:r>
+                <a:rPr lang="en-US" dirty="0" err="1"/>
+                <a:t>main.s</a:t>
+              </a:r>
+              <a:endParaRPr lang="en-US" dirty="0"/>
+            </a:p>
+          </p:txBody>
+        </p:sp>
+        <p:sp>
+          <p:nvSpPr>
+            <p:cNvPr id="29" name="TextBox 28"/>
+            <p:cNvSpPr txBox="1"/>
+            <p:nvPr/>
+          </p:nvSpPr>
+          <p:spPr>
+            <a:xfrm>
+              <a:off x="2921243" y="3185376"/>
+              <a:ext cx="1239716" cy="276999"/>
+            </a:xfrm>
+            <a:prstGeom prst="rect">
+              <a:avLst/>
+            </a:prstGeom>
+            <a:noFill/>
+          </p:spPr>
+          <p:txBody>
+            <a:bodyPr wrap="square" rtlCol="0">
+              <a:spAutoFit/>
+            </a:bodyPr>
+            <a:lstStyle/>
+            <a:p>
+              <a:pPr algn="ctr"/>
+              <a:r>
+                <a:rPr lang="en-US" sz="1200" i="1" dirty="0">
+                  <a:solidFill>
+                    <a:srgbClr val="0070C0"/>
+                  </a:solidFill>
+                </a:rPr>
+                <a:t>Assembler code</a:t>
+              </a:r>
+            </a:p>
+          </p:txBody>
+        </p:sp>
+        <p:cxnSp>
+          <p:nvCxnSpPr>
+            <p:cNvPr id="30" name="Straight Arrow Connector 29"/>
+            <p:cNvCxnSpPr>
+              <a:stCxn id="27" idx="2"/>
+              <a:endCxn id="35" idx="0"/>
+            </p:cNvCxnSpPr>
+            <p:nvPr/>
+          </p:nvCxnSpPr>
+          <p:spPr>
+            <a:xfrm>
+              <a:off x="4919296" y="3556873"/>
+              <a:ext cx="0" cy="288950"/>
+            </a:xfrm>
+            <a:prstGeom prst="straightConnector1">
+              <a:avLst/>
+            </a:prstGeom>
+            <a:ln w="38100">
+              <a:tailEnd type="triangle"/>
+            </a:ln>
+          </p:spPr>
+          <p:style>
+            <a:lnRef idx="3">
+              <a:schemeClr val="dk1"/>
+            </a:lnRef>
+            <a:fillRef idx="0">
+              <a:schemeClr val="dk1"/>
+            </a:fillRef>
+            <a:effectRef idx="2">
+              <a:schemeClr val="dk1"/>
+            </a:effectRef>
+            <a:fontRef idx="minor">
+              <a:schemeClr val="tx1"/>
+            </a:fontRef>
+          </p:style>
+        </p:cxnSp>
+        <p:sp>
+          <p:nvSpPr>
+            <p:cNvPr id="35" name="Rounded Rectangle 34"/>
+            <p:cNvSpPr/>
+            <p:nvPr/>
+          </p:nvSpPr>
+          <p:spPr>
+            <a:xfrm>
+              <a:off x="4044462" y="3845823"/>
+              <a:ext cx="1749668" cy="413238"/>
+            </a:xfrm>
+            <a:prstGeom prst="roundRect">
+              <a:avLst/>
+            </a:prstGeom>
+          </p:spPr>
+          <p:style>
+            <a:lnRef idx="0">
+              <a:schemeClr val="accent6"/>
+            </a:lnRef>
+            <a:fillRef idx="3">
+              <a:schemeClr val="accent6"/>
+            </a:fillRef>
+            <a:effectRef idx="3">
+              <a:schemeClr val="accent6"/>
+            </a:effectRef>
+            <a:fontRef idx="minor">
+              <a:schemeClr val="lt1"/>
+            </a:fontRef>
+          </p:style>
+          <p:txBody>
+            <a:bodyPr rtlCol="0" anchor="ctr"/>
+            <a:lstStyle/>
+            <a:p>
+              <a:pPr algn="ctr"/>
+              <a:r>
+                <a:rPr lang="en-US" dirty="0"/>
+                <a:t>Assembler</a:t>
+              </a:r>
+            </a:p>
+          </p:txBody>
+        </p:sp>
+        <p:sp>
+          <p:nvSpPr>
+            <p:cNvPr id="37" name="Rectangle 36"/>
+            <p:cNvSpPr/>
+            <p:nvPr/>
+          </p:nvSpPr>
+          <p:spPr>
+            <a:xfrm>
+              <a:off x="4343400" y="4548011"/>
+              <a:ext cx="1151792" cy="465993"/>
+            </a:xfrm>
+            <a:prstGeom prst="rect">
+              <a:avLst/>
+            </a:prstGeom>
+          </p:spPr>
+          <p:style>
+            <a:lnRef idx="0">
+              <a:schemeClr val="accent3"/>
+            </a:lnRef>
+            <a:fillRef idx="3">
+              <a:schemeClr val="accent3"/>
+            </a:fillRef>
+            <a:effectRef idx="3">
+              <a:schemeClr val="accent3"/>
+            </a:effectRef>
+            <a:fontRef idx="minor">
+              <a:schemeClr val="lt1"/>
+            </a:fontRef>
+          </p:style>
+          <p:txBody>
+            <a:bodyPr rtlCol="0" anchor="ctr"/>
+            <a:lstStyle/>
+            <a:p>
+              <a:pPr algn="ctr"/>
+              <a:r>
+                <a:rPr lang="en-US" dirty="0" err="1"/>
+                <a:t>main.o</a:t>
+              </a:r>
+              <a:endParaRPr lang="en-US" dirty="0"/>
+            </a:p>
+          </p:txBody>
+        </p:sp>
+        <p:cxnSp>
+          <p:nvCxnSpPr>
+            <p:cNvPr id="39" name="Straight Arrow Connector 38"/>
+            <p:cNvCxnSpPr>
+              <a:stCxn id="35" idx="2"/>
+              <a:endCxn id="37" idx="0"/>
+            </p:cNvCxnSpPr>
+            <p:nvPr/>
+          </p:nvCxnSpPr>
+          <p:spPr>
+            <a:xfrm>
+              <a:off x="4919296" y="4259061"/>
+              <a:ext cx="0" cy="288950"/>
+            </a:xfrm>
+            <a:prstGeom prst="straightConnector1">
+              <a:avLst/>
+            </a:prstGeom>
+            <a:ln w="38100">
+              <a:tailEnd type="triangle"/>
+            </a:ln>
+          </p:spPr>
+          <p:style>
+            <a:lnRef idx="3">
+              <a:schemeClr val="dk1"/>
+            </a:lnRef>
+            <a:fillRef idx="0">
+              <a:schemeClr val="dk1"/>
+            </a:fillRef>
+            <a:effectRef idx="2">
+              <a:schemeClr val="dk1"/>
+            </a:effectRef>
+            <a:fontRef idx="minor">
+              <a:schemeClr val="tx1"/>
+            </a:fontRef>
+          </p:style>
+        </p:cxnSp>
+        <p:sp>
+          <p:nvSpPr>
+            <p:cNvPr id="42" name="TextBox 41"/>
+            <p:cNvSpPr txBox="1"/>
+            <p:nvPr/>
+          </p:nvSpPr>
+          <p:spPr>
+            <a:xfrm>
+              <a:off x="2921243" y="4642508"/>
+              <a:ext cx="1239716" cy="276999"/>
+            </a:xfrm>
+            <a:prstGeom prst="rect">
+              <a:avLst/>
+            </a:prstGeom>
+            <a:noFill/>
+          </p:spPr>
+          <p:txBody>
+            <a:bodyPr wrap="square" rtlCol="0">
+              <a:spAutoFit/>
+            </a:bodyPr>
+            <a:lstStyle/>
+            <a:p>
+              <a:pPr algn="ctr"/>
+              <a:r>
+                <a:rPr lang="en-US" sz="1200" i="1" dirty="0">
+                  <a:solidFill>
+                    <a:srgbClr val="0070C0"/>
+                  </a:solidFill>
+                </a:rPr>
+                <a:t>Object code</a:t>
+              </a:r>
+            </a:p>
+          </p:txBody>
+        </p:sp>
+        <p:sp>
+          <p:nvSpPr>
+            <p:cNvPr id="46" name="Rounded Rectangle 45"/>
+            <p:cNvSpPr/>
+            <p:nvPr/>
+          </p:nvSpPr>
+          <p:spPr>
+            <a:xfrm>
+              <a:off x="4044462" y="5302954"/>
+              <a:ext cx="1749668" cy="413238"/>
+            </a:xfrm>
+            <a:prstGeom prst="roundRect">
+              <a:avLst/>
+            </a:prstGeom>
+          </p:spPr>
+          <p:style>
+            <a:lnRef idx="0">
+              <a:schemeClr val="accent6"/>
+            </a:lnRef>
+            <a:fillRef idx="3">
+              <a:schemeClr val="accent6"/>
+            </a:fillRef>
+            <a:effectRef idx="3">
+              <a:schemeClr val="accent6"/>
+            </a:effectRef>
+            <a:fontRef idx="minor">
+              <a:schemeClr val="lt1"/>
+            </a:fontRef>
+          </p:style>
+          <p:txBody>
+            <a:bodyPr rtlCol="0" anchor="ctr"/>
+            <a:lstStyle/>
+            <a:p>
+              <a:pPr algn="ctr"/>
+              <a:r>
+                <a:rPr lang="en-US" dirty="0"/>
+                <a:t>Linker</a:t>
+              </a:r>
+            </a:p>
+          </p:txBody>
+        </p:sp>
+        <p:cxnSp>
+          <p:nvCxnSpPr>
+            <p:cNvPr id="47" name="Straight Arrow Connector 46"/>
+            <p:cNvCxnSpPr>
+              <a:stCxn id="37" idx="2"/>
+              <a:endCxn id="46" idx="0"/>
+            </p:cNvCxnSpPr>
+            <p:nvPr/>
+          </p:nvCxnSpPr>
+          <p:spPr>
+            <a:xfrm>
+              <a:off x="4919296" y="5014004"/>
+              <a:ext cx="0" cy="288950"/>
+            </a:xfrm>
+            <a:prstGeom prst="straightConnector1">
+              <a:avLst/>
+            </a:prstGeom>
+            <a:ln w="38100">
+              <a:tailEnd type="triangle"/>
+            </a:ln>
+          </p:spPr>
+          <p:style>
+            <a:lnRef idx="3">
+              <a:schemeClr val="dk1"/>
+            </a:lnRef>
+            <a:fillRef idx="0">
+              <a:schemeClr val="dk1"/>
+            </a:fillRef>
+            <a:effectRef idx="2">
+              <a:schemeClr val="dk1"/>
+            </a:effectRef>
+            <a:fontRef idx="minor">
+              <a:schemeClr val="tx1"/>
+            </a:fontRef>
+          </p:style>
+        </p:cxnSp>
+        <p:sp>
+          <p:nvSpPr>
+            <p:cNvPr id="50" name="Rectangle 49"/>
+            <p:cNvSpPr/>
+            <p:nvPr/>
+          </p:nvSpPr>
+          <p:spPr>
+            <a:xfrm>
+              <a:off x="4343400" y="6005145"/>
+              <a:ext cx="1151792" cy="465993"/>
+            </a:xfrm>
+            <a:prstGeom prst="rect">
+              <a:avLst/>
+            </a:prstGeom>
+          </p:spPr>
+          <p:style>
+            <a:lnRef idx="0">
+              <a:schemeClr val="accent2"/>
+            </a:lnRef>
+            <a:fillRef idx="3">
+              <a:schemeClr val="accent2"/>
+            </a:fillRef>
+            <a:effectRef idx="3">
+              <a:schemeClr val="accent2"/>
+            </a:effectRef>
+            <a:fontRef idx="minor">
+              <a:schemeClr val="lt1"/>
+            </a:fontRef>
+          </p:style>
+          <p:txBody>
+            <a:bodyPr rtlCol="0" anchor="ctr"/>
+            <a:lstStyle/>
+            <a:p>
+              <a:pPr algn="ctr"/>
+              <a:r>
+                <a:rPr lang="en-US" dirty="0"/>
+                <a:t>Hello</a:t>
+              </a:r>
+            </a:p>
+          </p:txBody>
+        </p:sp>
+        <p:cxnSp>
+          <p:nvCxnSpPr>
+            <p:cNvPr id="51" name="Straight Arrow Connector 50"/>
+            <p:cNvCxnSpPr>
+              <a:stCxn id="46" idx="2"/>
+              <a:endCxn id="50" idx="0"/>
+            </p:cNvCxnSpPr>
+            <p:nvPr/>
+          </p:nvCxnSpPr>
+          <p:spPr>
+            <a:xfrm>
+              <a:off x="4919296" y="5716192"/>
+              <a:ext cx="0" cy="288953"/>
+            </a:xfrm>
+            <a:prstGeom prst="straightConnector1">
+              <a:avLst/>
+            </a:prstGeom>
+            <a:ln w="38100">
+              <a:tailEnd type="triangle"/>
+            </a:ln>
+          </p:spPr>
+          <p:style>
+            <a:lnRef idx="3">
+              <a:schemeClr val="dk1"/>
+            </a:lnRef>
+            <a:fillRef idx="0">
+              <a:schemeClr val="dk1"/>
+            </a:fillRef>
+            <a:effectRef idx="2">
+              <a:schemeClr val="dk1"/>
+            </a:effectRef>
+            <a:fontRef idx="minor">
+              <a:schemeClr val="tx1"/>
+            </a:fontRef>
+          </p:style>
+        </p:cxnSp>
+        <p:sp>
+          <p:nvSpPr>
+            <p:cNvPr id="59" name="TextBox 58"/>
+            <p:cNvSpPr txBox="1"/>
+            <p:nvPr/>
+          </p:nvSpPr>
+          <p:spPr>
+            <a:xfrm>
+              <a:off x="2921243" y="6009473"/>
+              <a:ext cx="1239716" cy="461665"/>
+            </a:xfrm>
+            <a:prstGeom prst="rect">
+              <a:avLst/>
+            </a:prstGeom>
+            <a:noFill/>
+          </p:spPr>
+          <p:txBody>
+            <a:bodyPr wrap="square" rtlCol="0">
+              <a:spAutoFit/>
+            </a:bodyPr>
+            <a:lstStyle/>
+            <a:p>
+              <a:pPr algn="ctr"/>
+              <a:r>
+                <a:rPr lang="en-US" sz="1200" i="1" dirty="0">
+                  <a:solidFill>
+                    <a:srgbClr val="0070C0"/>
+                  </a:solidFill>
+                </a:rPr>
+                <a:t>Executable Program</a:t>
+              </a:r>
+            </a:p>
+          </p:txBody>
+        </p:sp>
+        <p:sp>
+          <p:nvSpPr>
+            <p:cNvPr id="60" name="Rectangle 59"/>
+            <p:cNvSpPr/>
+            <p:nvPr/>
+          </p:nvSpPr>
+          <p:spPr>
+            <a:xfrm>
+              <a:off x="6370026" y="5276578"/>
+              <a:ext cx="2571751" cy="466344"/>
+            </a:xfrm>
+            <a:prstGeom prst="rect">
+              <a:avLst/>
+            </a:prstGeom>
+          </p:spPr>
+          <p:style>
+            <a:lnRef idx="0">
+              <a:schemeClr val="dk1"/>
+            </a:lnRef>
+            <a:fillRef idx="3">
+              <a:schemeClr val="dk1"/>
+            </a:fillRef>
+            <a:effectRef idx="3">
+              <a:schemeClr val="dk1"/>
+            </a:effectRef>
+            <a:fontRef idx="minor">
+              <a:schemeClr val="lt1"/>
+            </a:fontRef>
+          </p:style>
+          <p:txBody>
+            <a:bodyPr rtlCol="0" anchor="ctr"/>
+            <a:lstStyle/>
+            <a:p>
+              <a:pPr algn="ctr"/>
+              <a:r>
+                <a:rPr lang="en-US" dirty="0"/>
+                <a:t>Object code of Libraries</a:t>
+              </a:r>
+            </a:p>
+          </p:txBody>
+        </p:sp>
+        <p:cxnSp>
+          <p:nvCxnSpPr>
+            <p:cNvPr id="61" name="Straight Arrow Connector 60"/>
+            <p:cNvCxnSpPr>
+              <a:stCxn id="60" idx="1"/>
+              <a:endCxn id="46" idx="3"/>
+            </p:cNvCxnSpPr>
+            <p:nvPr/>
+          </p:nvCxnSpPr>
+          <p:spPr>
+            <a:xfrm flipH="1" flipV="1">
+              <a:off x="5794130" y="5509573"/>
+              <a:ext cx="575896" cy="177"/>
+            </a:xfrm>
+            <a:prstGeom prst="straightConnector1">
+              <a:avLst/>
+            </a:prstGeom>
+            <a:ln w="38100">
+              <a:tailEnd type="triangle"/>
+            </a:ln>
+          </p:spPr>
+          <p:style>
+            <a:lnRef idx="3">
+              <a:schemeClr val="dk1"/>
+            </a:lnRef>
+            <a:fillRef idx="0">
+              <a:schemeClr val="dk1"/>
+            </a:fillRef>
+            <a:effectRef idx="2">
+              <a:schemeClr val="dk1"/>
+            </a:effectRef>
+            <a:fontRef idx="minor">
+              <a:schemeClr val="tx1"/>
+            </a:fontRef>
+          </p:style>
+        </p:cxnSp>
+        <p:sp>
+          <p:nvSpPr>
+            <p:cNvPr id="66" name="TextBox 65"/>
+            <p:cNvSpPr txBox="1"/>
+            <p:nvPr/>
+          </p:nvSpPr>
+          <p:spPr>
+            <a:xfrm>
+              <a:off x="3502212" y="5329887"/>
+              <a:ext cx="389850" cy="369332"/>
+            </a:xfrm>
+            <a:prstGeom prst="rect">
+              <a:avLst/>
+            </a:prstGeom>
+            <a:noFill/>
+          </p:spPr>
+          <p:txBody>
+            <a:bodyPr wrap="none" rtlCol="0">
+              <a:spAutoFit/>
+            </a:bodyPr>
+            <a:lstStyle/>
+            <a:p>
+              <a:r>
+                <a:rPr lang="en-US" dirty="0">
+                  <a:solidFill>
+                    <a:srgbClr val="FF0000"/>
+                  </a:solidFill>
+                  <a:sym typeface="Wingdings" panose="05000000000000000000" pitchFamily="2" charset="2"/>
+                </a:rPr>
+                <a:t></a:t>
+              </a:r>
+              <a:endParaRPr lang="en-US" dirty="0">
+                <a:solidFill>
+                  <a:srgbClr val="FF0000"/>
+                </a:solidFill>
+              </a:endParaRPr>
+            </a:p>
+          </p:txBody>
+        </p:sp>
+        <p:sp>
+          <p:nvSpPr>
+            <p:cNvPr id="67" name="TextBox 66"/>
+            <p:cNvSpPr txBox="1"/>
+            <p:nvPr/>
+          </p:nvSpPr>
+          <p:spPr>
+            <a:xfrm>
+              <a:off x="3502212" y="3861855"/>
+              <a:ext cx="389850" cy="369332"/>
+            </a:xfrm>
+            <a:prstGeom prst="rect">
+              <a:avLst/>
+            </a:prstGeom>
+            <a:noFill/>
+          </p:spPr>
+          <p:txBody>
+            <a:bodyPr wrap="none" rtlCol="0">
+              <a:spAutoFit/>
+            </a:bodyPr>
+            <a:lstStyle/>
+            <a:p>
+              <a:r>
+                <a:rPr lang="en-US" dirty="0">
+                  <a:solidFill>
+                    <a:srgbClr val="FF0000"/>
+                  </a:solidFill>
+                  <a:sym typeface="Wingdings" panose="05000000000000000000" pitchFamily="2" charset="2"/>
+                </a:rPr>
+                <a:t></a:t>
+              </a:r>
+              <a:endParaRPr lang="en-US" dirty="0">
+                <a:solidFill>
+                  <a:srgbClr val="FF0000"/>
+                </a:solidFill>
+              </a:endParaRPr>
+            </a:p>
+          </p:txBody>
+        </p:sp>
+        <p:sp>
+          <p:nvSpPr>
+            <p:cNvPr id="68" name="TextBox 67"/>
+            <p:cNvSpPr txBox="1"/>
+            <p:nvPr/>
+          </p:nvSpPr>
+          <p:spPr>
+            <a:xfrm>
+              <a:off x="3502212" y="2410644"/>
+              <a:ext cx="389850" cy="369332"/>
+            </a:xfrm>
+            <a:prstGeom prst="rect">
+              <a:avLst/>
+            </a:prstGeom>
+            <a:noFill/>
+          </p:spPr>
+          <p:txBody>
+            <a:bodyPr wrap="none" rtlCol="0">
+              <a:spAutoFit/>
+            </a:bodyPr>
+            <a:lstStyle/>
+            <a:p>
+              <a:r>
+                <a:rPr lang="en-US" dirty="0">
+                  <a:solidFill>
+                    <a:srgbClr val="FF0000"/>
+                  </a:solidFill>
+                  <a:sym typeface="Wingdings" panose="05000000000000000000" pitchFamily="2" charset="2"/>
+                </a:rPr>
+                <a:t></a:t>
+              </a:r>
+              <a:endParaRPr lang="en-US" dirty="0">
+                <a:solidFill>
+                  <a:srgbClr val="FF0000"/>
+                </a:solidFill>
+              </a:endParaRPr>
+            </a:p>
+          </p:txBody>
+        </p:sp>
+        <p:sp>
+          <p:nvSpPr>
+            <p:cNvPr id="69" name="TextBox 68"/>
+            <p:cNvSpPr txBox="1"/>
+            <p:nvPr/>
+          </p:nvSpPr>
+          <p:spPr>
+            <a:xfrm>
+              <a:off x="3502212" y="953514"/>
+              <a:ext cx="389850" cy="369332"/>
+            </a:xfrm>
+            <a:prstGeom prst="rect">
+              <a:avLst/>
+            </a:prstGeom>
+            <a:noFill/>
+          </p:spPr>
+          <p:txBody>
+            <a:bodyPr wrap="none" rtlCol="0">
+              <a:spAutoFit/>
+            </a:bodyPr>
+            <a:lstStyle/>
+            <a:p>
+              <a:r>
+                <a:rPr lang="en-US" dirty="0">
+                  <a:solidFill>
+                    <a:srgbClr val="FF0000"/>
+                  </a:solidFill>
+                  <a:sym typeface="Wingdings" panose="05000000000000000000" pitchFamily="2" charset="2"/>
+                </a:rPr>
+                <a:t></a:t>
+              </a:r>
+              <a:endParaRPr lang="en-US" dirty="0">
+                <a:solidFill>
+                  <a:srgbClr val="FF0000"/>
+                </a:solidFill>
+              </a:endParaRPr>
+            </a:p>
+          </p:txBody>
+        </p:sp>
+      </p:grpSp>
+    </p:spTree>
+    <p:extLst>
+      <p:ext uri="{BB962C8B-B14F-4D97-AF65-F5344CB8AC3E}">
+        <p14:creationId xmlns:p14="http://schemas.microsoft.com/office/powerpoint/2010/main" val="102207685"/>
+      </p:ext>
+    </p:extLst>
+  </p:cSld>
+  <p:clrMapOvr>
+    <a:masterClrMapping/>
+  </p:clrMapOvr>
+</p:sld>
+</file>
+
 <file path=ppt/theme/theme1.xml><?xml version="1.0" encoding="utf-8"?>
 <a:theme xmlns:a="http://schemas.openxmlformats.org/drawingml/2006/main" name="Office Theme">
   <a:themeElements>

</xml_diff>